<commit_message>
Revert "Pull master into UART hardware so that FreeRTOS functions can be used"
Former-commit-id: ca5a445031a9f76a3b49bc85f87dc9f3df54b915 [formerly 555d141b14a2a58a69375b24f43af484b1b59878]
Former-commit-id: 42de34d8c436bd477a4bdc2fc4424a98d57dc3c6
</commit_message>
<xml_diff>
--- a/Robot/Doc/Media/Design_Future_2018/August-6-2018-Design.pptx
+++ b/Robot/Doc/Media/Design_Future_2018/August-6-2018-Design.pptx
@@ -262,7 +262,7 @@
           <a:p>
             <a:fld id="{27618F12-50B0-4BBB-A094-D855E9207FF2}" type="datetimeFigureOut">
               <a:rPr lang="en-CA" smtClean="0"/>
-              <a:t>2018-09-15</a:t>
+              <a:t>2018-08-06</a:t>
             </a:fld>
             <a:endParaRPr lang="en-CA"/>
           </a:p>
@@ -462,7 +462,7 @@
           <a:p>
             <a:fld id="{27618F12-50B0-4BBB-A094-D855E9207FF2}" type="datetimeFigureOut">
               <a:rPr lang="en-CA" smtClean="0"/>
-              <a:t>2018-09-15</a:t>
+              <a:t>2018-08-06</a:t>
             </a:fld>
             <a:endParaRPr lang="en-CA"/>
           </a:p>
@@ -672,7 +672,7 @@
           <a:p>
             <a:fld id="{27618F12-50B0-4BBB-A094-D855E9207FF2}" type="datetimeFigureOut">
               <a:rPr lang="en-CA" smtClean="0"/>
-              <a:t>2018-09-15</a:t>
+              <a:t>2018-08-06</a:t>
             </a:fld>
             <a:endParaRPr lang="en-CA"/>
           </a:p>
@@ -872,7 +872,7 @@
           <a:p>
             <a:fld id="{27618F12-50B0-4BBB-A094-D855E9207FF2}" type="datetimeFigureOut">
               <a:rPr lang="en-CA" smtClean="0"/>
-              <a:t>2018-09-15</a:t>
+              <a:t>2018-08-06</a:t>
             </a:fld>
             <a:endParaRPr lang="en-CA"/>
           </a:p>
@@ -1148,7 +1148,7 @@
           <a:p>
             <a:fld id="{27618F12-50B0-4BBB-A094-D855E9207FF2}" type="datetimeFigureOut">
               <a:rPr lang="en-CA" smtClean="0"/>
-              <a:t>2018-09-15</a:t>
+              <a:t>2018-08-06</a:t>
             </a:fld>
             <a:endParaRPr lang="en-CA"/>
           </a:p>
@@ -1416,7 +1416,7 @@
           <a:p>
             <a:fld id="{27618F12-50B0-4BBB-A094-D855E9207FF2}" type="datetimeFigureOut">
               <a:rPr lang="en-CA" smtClean="0"/>
-              <a:t>2018-09-15</a:t>
+              <a:t>2018-08-06</a:t>
             </a:fld>
             <a:endParaRPr lang="en-CA"/>
           </a:p>
@@ -1831,7 +1831,7 @@
           <a:p>
             <a:fld id="{27618F12-50B0-4BBB-A094-D855E9207FF2}" type="datetimeFigureOut">
               <a:rPr lang="en-CA" smtClean="0"/>
-              <a:t>2018-09-15</a:t>
+              <a:t>2018-08-06</a:t>
             </a:fld>
             <a:endParaRPr lang="en-CA"/>
           </a:p>
@@ -1973,7 +1973,7 @@
           <a:p>
             <a:fld id="{27618F12-50B0-4BBB-A094-D855E9207FF2}" type="datetimeFigureOut">
               <a:rPr lang="en-CA" smtClean="0"/>
-              <a:t>2018-09-15</a:t>
+              <a:t>2018-08-06</a:t>
             </a:fld>
             <a:endParaRPr lang="en-CA"/>
           </a:p>
@@ -2086,7 +2086,7 @@
           <a:p>
             <a:fld id="{27618F12-50B0-4BBB-A094-D855E9207FF2}" type="datetimeFigureOut">
               <a:rPr lang="en-CA" smtClean="0"/>
-              <a:t>2018-09-15</a:t>
+              <a:t>2018-08-06</a:t>
             </a:fld>
             <a:endParaRPr lang="en-CA"/>
           </a:p>
@@ -2399,7 +2399,7 @@
           <a:p>
             <a:fld id="{27618F12-50B0-4BBB-A094-D855E9207FF2}" type="datetimeFigureOut">
               <a:rPr lang="en-CA" smtClean="0"/>
-              <a:t>2018-09-15</a:t>
+              <a:t>2018-08-06</a:t>
             </a:fld>
             <a:endParaRPr lang="en-CA"/>
           </a:p>
@@ -2688,7 +2688,7 @@
           <a:p>
             <a:fld id="{27618F12-50B0-4BBB-A094-D855E9207FF2}" type="datetimeFigureOut">
               <a:rPr lang="en-CA" smtClean="0"/>
-              <a:t>2018-09-15</a:t>
+              <a:t>2018-08-06</a:t>
             </a:fld>
             <a:endParaRPr lang="en-CA"/>
           </a:p>
@@ -2931,7 +2931,7 @@
           <a:p>
             <a:fld id="{27618F12-50B0-4BBB-A094-D855E9207FF2}" type="datetimeFigureOut">
               <a:rPr lang="en-CA" smtClean="0"/>
-              <a:t>2018-09-15</a:t>
+              <a:t>2018-08-06</a:t>
             </a:fld>
             <a:endParaRPr lang="en-CA"/>
           </a:p>
@@ -10170,7 +10170,7 @@
         <p:spPr>
           <a:xfrm>
             <a:off x="3614943" y="1876807"/>
-            <a:ext cx="1761774" cy="4437682"/>
+            <a:ext cx="1761774" cy="2903841"/>
           </a:xfrm>
           <a:prstGeom prst="roundRect">
             <a:avLst/>
@@ -10214,6 +10214,63 @@
       </p:sp>
       <p:sp>
         <p:nvSpPr>
+          <p:cNvPr id="24" name="Rectangle: Rounded Corners 23">
+            <a:extLst>
+              <a:ext uri="{FF2B5EF4-FFF2-40B4-BE49-F238E27FC236}">
+                <a16:creationId xmlns:a16="http://schemas.microsoft.com/office/drawing/2014/main" id="{69CABEA3-EB22-4C12-829A-101668FA5D21}"/>
+              </a:ext>
+            </a:extLst>
+          </p:cNvPr>
+          <p:cNvSpPr/>
+          <p:nvPr/>
+        </p:nvSpPr>
+        <p:spPr>
+          <a:xfrm>
+            <a:off x="6096000" y="2614125"/>
+            <a:ext cx="1581784" cy="1431489"/>
+          </a:xfrm>
+          <a:prstGeom prst="roundRect">
+            <a:avLst/>
+          </a:prstGeom>
+          <a:solidFill>
+            <a:schemeClr val="bg1">
+              <a:lumMod val="65000"/>
+              <a:alpha val="42000"/>
+            </a:schemeClr>
+          </a:solidFill>
+          <a:ln>
+            <a:solidFill>
+              <a:schemeClr val="tx1"/>
+            </a:solidFill>
+          </a:ln>
+        </p:spPr>
+        <p:style>
+          <a:lnRef idx="2">
+            <a:schemeClr val="accent1">
+              <a:shade val="50000"/>
+            </a:schemeClr>
+          </a:lnRef>
+          <a:fillRef idx="1">
+            <a:schemeClr val="accent1"/>
+          </a:fillRef>
+          <a:effectRef idx="0">
+            <a:schemeClr val="accent1"/>
+          </a:effectRef>
+          <a:fontRef idx="minor">
+            <a:schemeClr val="lt1"/>
+          </a:fontRef>
+        </p:style>
+        <p:txBody>
+          <a:bodyPr rtlCol="0" anchor="ctr"/>
+          <a:lstStyle/>
+          <a:p>
+            <a:pPr algn="ctr"/>
+            <a:endParaRPr lang="en-CA"/>
+          </a:p>
+        </p:txBody>
+      </p:sp>
+      <p:sp>
+        <p:nvSpPr>
           <p:cNvPr id="25" name="TextBox 24">
             <a:extLst>
               <a:ext uri="{FF2B5EF4-FFF2-40B4-BE49-F238E27FC236}">
@@ -10280,6 +10337,42 @@
             <a:r>
               <a:rPr lang="en-CA" b="1" dirty="0"/>
               <a:t>RX event handler</a:t>
+            </a:r>
+          </a:p>
+        </p:txBody>
+      </p:sp>
+      <p:sp>
+        <p:nvSpPr>
+          <p:cNvPr id="27" name="TextBox 26">
+            <a:extLst>
+              <a:ext uri="{FF2B5EF4-FFF2-40B4-BE49-F238E27FC236}">
+                <a16:creationId xmlns:a16="http://schemas.microsoft.com/office/drawing/2014/main" id="{9528E3CD-6F99-47B0-B50D-C7B138698B81}"/>
+              </a:ext>
+            </a:extLst>
+          </p:cNvPr>
+          <p:cNvSpPr txBox="1"/>
+          <p:nvPr/>
+        </p:nvSpPr>
+        <p:spPr>
+          <a:xfrm>
+            <a:off x="6096000" y="2644756"/>
+            <a:ext cx="1581784" cy="646331"/>
+          </a:xfrm>
+          <a:prstGeom prst="rect">
+            <a:avLst/>
+          </a:prstGeom>
+          <a:noFill/>
+        </p:spPr>
+        <p:txBody>
+          <a:bodyPr wrap="square" rtlCol="0">
+            <a:spAutoFit/>
+          </a:bodyPr>
+          <a:lstStyle/>
+          <a:p>
+            <a:pPr algn="ctr"/>
+            <a:r>
+              <a:rPr lang="en-CA" b="1" dirty="0"/>
+              <a:t>Equipment handler</a:t>
             </a:r>
           </a:p>
         </p:txBody>
@@ -10374,7 +10467,7 @@
             <a:pPr algn="ctr"/>
             <a:r>
               <a:rPr lang="en-CA" dirty="0"/>
-              <a:t>Equipment handler</a:t>
+              <a:t>Update equipment command cache</a:t>
             </a:r>
           </a:p>
         </p:txBody>
@@ -14745,17 +14838,20 @@
           </p:cNvPr>
           <p:cNvCxnSpPr>
             <a:cxnSpLocks/>
+            <a:stCxn id="27" idx="3"/>
+            <a:endCxn id="70" idx="0"/>
           </p:cNvCxnSpPr>
           <p:nvPr/>
         </p:nvCxnSpPr>
         <p:spPr>
           <a:xfrm flipV="1">
-            <a:off x="5338622" y="463561"/>
-            <a:ext cx="3630578" cy="2890053"/>
-          </a:xfrm>
-          <a:prstGeom prst="curvedConnector3">
+            <a:off x="7677784" y="454547"/>
+            <a:ext cx="1314187" cy="2513375"/>
+          </a:xfrm>
+          <a:prstGeom prst="curvedConnector4">
             <a:avLst>
-              <a:gd name="adj1" fmla="val 45599"/>
+              <a:gd name="adj1" fmla="val 41550"/>
+              <a:gd name="adj2" fmla="val 109095"/>
             </a:avLst>
           </a:prstGeom>
           <a:ln w="25400">
@@ -14791,19 +14887,20 @@
           </p:cNvPr>
           <p:cNvCxnSpPr>
             <a:cxnSpLocks/>
-            <a:stCxn id="41" idx="3"/>
-            <a:endCxn id="70" idx="1"/>
+            <a:stCxn id="27" idx="3"/>
+            <a:endCxn id="70" idx="0"/>
           </p:cNvCxnSpPr>
           <p:nvPr/>
         </p:nvCxnSpPr>
         <p:spPr>
           <a:xfrm flipV="1">
-            <a:off x="5332178" y="580524"/>
-            <a:ext cx="3437698" cy="2783937"/>
-          </a:xfrm>
-          <a:prstGeom prst="curvedConnector3">
+            <a:off x="7677784" y="454547"/>
+            <a:ext cx="1314187" cy="2513375"/>
+          </a:xfrm>
+          <a:prstGeom prst="curvedConnector4">
             <a:avLst>
-              <a:gd name="adj1" fmla="val 53357"/>
+              <a:gd name="adj1" fmla="val 41550"/>
+              <a:gd name="adj2" fmla="val 104547"/>
             </a:avLst>
           </a:prstGeom>
           <a:ln w="25400">
@@ -14839,19 +14936,20 @@
           </p:cNvPr>
           <p:cNvCxnSpPr>
             <a:cxnSpLocks/>
-            <a:stCxn id="41" idx="3"/>
-            <a:endCxn id="70" idx="1"/>
+            <a:stCxn id="27" idx="3"/>
+            <a:endCxn id="70" idx="0"/>
           </p:cNvCxnSpPr>
           <p:nvPr/>
         </p:nvCxnSpPr>
         <p:spPr>
           <a:xfrm flipV="1">
-            <a:off x="5332178" y="580524"/>
-            <a:ext cx="3437698" cy="2783937"/>
-          </a:xfrm>
-          <a:prstGeom prst="curvedConnector3">
+            <a:off x="7677784" y="454547"/>
+            <a:ext cx="1314187" cy="2513375"/>
+          </a:xfrm>
+          <a:prstGeom prst="curvedConnector4">
             <a:avLst>
-              <a:gd name="adj1" fmla="val 50000"/>
+              <a:gd name="adj1" fmla="val 41550"/>
+              <a:gd name="adj2" fmla="val 113992"/>
             </a:avLst>
           </a:prstGeom>
           <a:ln w="25400">
@@ -14887,20 +14985,20 @@
           </p:cNvPr>
           <p:cNvCxnSpPr>
             <a:cxnSpLocks/>
-            <a:stCxn id="41" idx="3"/>
+            <a:stCxn id="24" idx="3"/>
             <a:endCxn id="92" idx="0"/>
           </p:cNvCxnSpPr>
           <p:nvPr/>
         </p:nvCxnSpPr>
         <p:spPr>
           <a:xfrm flipV="1">
-            <a:off x="5332178" y="1746289"/>
-            <a:ext cx="3659760" cy="1618172"/>
+            <a:off x="7677784" y="1746289"/>
+            <a:ext cx="1314154" cy="1583581"/>
           </a:xfrm>
           <a:prstGeom prst="curvedConnector4">
             <a:avLst>
-              <a:gd name="adj1" fmla="val 63704"/>
-              <a:gd name="adj2" fmla="val 114127"/>
+              <a:gd name="adj1" fmla="val 44449"/>
+              <a:gd name="adj2" fmla="val 114436"/>
             </a:avLst>
           </a:prstGeom>
           <a:ln w="25400">
@@ -14936,20 +15034,20 @@
           </p:cNvPr>
           <p:cNvCxnSpPr>
             <a:cxnSpLocks/>
-            <a:stCxn id="41" idx="3"/>
+            <a:stCxn id="24" idx="3"/>
             <a:endCxn id="92" idx="0"/>
           </p:cNvCxnSpPr>
           <p:nvPr/>
         </p:nvCxnSpPr>
         <p:spPr>
           <a:xfrm flipV="1">
-            <a:off x="5332178" y="1746289"/>
-            <a:ext cx="3659760" cy="1618172"/>
+            <a:off x="7677784" y="1746289"/>
+            <a:ext cx="1314154" cy="1583581"/>
           </a:xfrm>
           <a:prstGeom prst="curvedConnector4">
             <a:avLst>
-              <a:gd name="adj1" fmla="val 65402"/>
-              <a:gd name="adj2" fmla="val 114127"/>
+              <a:gd name="adj1" fmla="val 44449"/>
+              <a:gd name="adj2" fmla="val 125985"/>
             </a:avLst>
           </a:prstGeom>
           <a:ln w="25400">
@@ -14985,19 +15083,20 @@
           </p:cNvPr>
           <p:cNvCxnSpPr>
             <a:cxnSpLocks/>
+            <a:stCxn id="24" idx="3"/>
             <a:endCxn id="92" idx="0"/>
           </p:cNvCxnSpPr>
           <p:nvPr/>
         </p:nvCxnSpPr>
         <p:spPr>
           <a:xfrm flipV="1">
-            <a:off x="5351257" y="1746289"/>
-            <a:ext cx="3640681" cy="1600886"/>
+            <a:off x="7677784" y="1746289"/>
+            <a:ext cx="1314154" cy="1583581"/>
           </a:xfrm>
           <a:prstGeom prst="curvedConnector4">
             <a:avLst>
-              <a:gd name="adj1" fmla="val 67189"/>
-              <a:gd name="adj2" fmla="val 114280"/>
+              <a:gd name="adj1" fmla="val 41550"/>
+              <a:gd name="adj2" fmla="val 119433"/>
             </a:avLst>
           </a:prstGeom>
           <a:ln w="25400">
@@ -15033,19 +15132,19 @@
           </p:cNvPr>
           <p:cNvCxnSpPr>
             <a:cxnSpLocks/>
-            <a:stCxn id="41" idx="2"/>
+            <a:stCxn id="24" idx="2"/>
             <a:endCxn id="136" idx="2"/>
           </p:cNvCxnSpPr>
           <p:nvPr/>
         </p:nvCxnSpPr>
         <p:spPr>
           <a:xfrm rot="16200000" flipH="1">
-            <a:off x="6430673" y="2015402"/>
-            <a:ext cx="626431" cy="4496121"/>
+            <a:off x="7673888" y="3258617"/>
+            <a:ext cx="531065" cy="2105057"/>
           </a:xfrm>
           <a:prstGeom prst="curvedConnector3">
             <a:avLst>
-              <a:gd name="adj1" fmla="val 81222"/>
+              <a:gd name="adj1" fmla="val 143046"/>
             </a:avLst>
           </a:prstGeom>
           <a:ln w="25400">
@@ -15081,19 +15180,19 @@
           </p:cNvPr>
           <p:cNvCxnSpPr>
             <a:cxnSpLocks/>
-            <a:stCxn id="41" idx="2"/>
+            <a:stCxn id="24" idx="2"/>
             <a:endCxn id="136" idx="2"/>
           </p:cNvCxnSpPr>
           <p:nvPr/>
         </p:nvCxnSpPr>
         <p:spPr>
           <a:xfrm rot="16200000" flipH="1">
-            <a:off x="6430673" y="2015402"/>
-            <a:ext cx="626431" cy="4496121"/>
+            <a:off x="7673888" y="3258617"/>
+            <a:ext cx="531065" cy="2105057"/>
           </a:xfrm>
           <a:prstGeom prst="curvedConnector3">
             <a:avLst>
-              <a:gd name="adj1" fmla="val 89725"/>
+              <a:gd name="adj1" fmla="val 108609"/>
             </a:avLst>
           </a:prstGeom>
           <a:ln w="25400">
@@ -15129,15 +15228,15 @@
           </p:cNvPr>
           <p:cNvCxnSpPr>
             <a:cxnSpLocks/>
-            <a:stCxn id="41" idx="2"/>
+            <a:stCxn id="24" idx="2"/>
             <a:endCxn id="136" idx="1"/>
           </p:cNvCxnSpPr>
           <p:nvPr/>
         </p:nvCxnSpPr>
         <p:spPr>
           <a:xfrm rot="16200000" flipH="1">
-            <a:off x="6382614" y="2063462"/>
-            <a:ext cx="500455" cy="4274026"/>
+            <a:off x="7625829" y="3306677"/>
+            <a:ext cx="405089" cy="1882962"/>
           </a:xfrm>
           <a:prstGeom prst="curvedConnector2">
             <a:avLst/>
@@ -15175,19 +15274,19 @@
           </p:cNvPr>
           <p:cNvCxnSpPr>
             <a:cxnSpLocks/>
-            <a:stCxn id="41" idx="2"/>
+            <a:stCxn id="24" idx="2"/>
             <a:endCxn id="158" idx="0"/>
           </p:cNvCxnSpPr>
           <p:nvPr/>
         </p:nvCxnSpPr>
         <p:spPr>
           <a:xfrm rot="16200000" flipH="1">
-            <a:off x="5915700" y="2530376"/>
-            <a:ext cx="1656366" cy="4496110"/>
+            <a:off x="7158915" y="3773591"/>
+            <a:ext cx="1561000" cy="2105046"/>
           </a:xfrm>
           <a:prstGeom prst="curvedConnector3">
             <a:avLst>
-              <a:gd name="adj1" fmla="val 76799"/>
+              <a:gd name="adj1" fmla="val 76035"/>
             </a:avLst>
           </a:prstGeom>
           <a:ln w="25400">
@@ -15223,15 +15322,15 @@
           </p:cNvPr>
           <p:cNvCxnSpPr>
             <a:cxnSpLocks/>
-            <a:stCxn id="41" idx="2"/>
+            <a:stCxn id="24" idx="2"/>
             <a:endCxn id="158" idx="1"/>
           </p:cNvCxnSpPr>
           <p:nvPr/>
         </p:nvCxnSpPr>
         <p:spPr>
           <a:xfrm rot="16200000" flipH="1">
-            <a:off x="5741664" y="2704411"/>
-            <a:ext cx="1782343" cy="4274015"/>
+            <a:off x="6984879" y="3947626"/>
+            <a:ext cx="1686977" cy="1882951"/>
           </a:xfrm>
           <a:prstGeom prst="curvedConnector2">
             <a:avLst/>
@@ -15269,19 +15368,19 @@
           </p:cNvPr>
           <p:cNvCxnSpPr>
             <a:cxnSpLocks/>
-            <a:stCxn id="41" idx="2"/>
+            <a:stCxn id="24" idx="2"/>
             <a:endCxn id="158" idx="0"/>
           </p:cNvCxnSpPr>
           <p:nvPr/>
         </p:nvCxnSpPr>
         <p:spPr>
           <a:xfrm rot="16200000" flipH="1">
-            <a:off x="5915700" y="2530376"/>
-            <a:ext cx="1656366" cy="4496110"/>
+            <a:off x="7158915" y="3773591"/>
+            <a:ext cx="1561000" cy="2105046"/>
           </a:xfrm>
           <a:prstGeom prst="curvedConnector3">
             <a:avLst>
-              <a:gd name="adj1" fmla="val 73047"/>
+              <a:gd name="adj1" fmla="val 85147"/>
             </a:avLst>
           </a:prstGeom>
           <a:ln w="25400">
@@ -15464,6 +15563,55 @@
           </a:fontRef>
         </p:style>
       </p:cxnSp>
+      <p:cxnSp>
+        <p:nvCxnSpPr>
+          <p:cNvPr id="185" name="Connector: Curved 184">
+            <a:extLst>
+              <a:ext uri="{FF2B5EF4-FFF2-40B4-BE49-F238E27FC236}">
+                <a16:creationId xmlns:a16="http://schemas.microsoft.com/office/drawing/2014/main" id="{6A7C86B0-544B-4290-A787-0CA221FDA3B2}"/>
+              </a:ext>
+            </a:extLst>
+          </p:cNvPr>
+          <p:cNvCxnSpPr>
+            <a:stCxn id="41" idx="2"/>
+            <a:endCxn id="27" idx="0"/>
+          </p:cNvCxnSpPr>
+          <p:nvPr/>
+        </p:nvCxnSpPr>
+        <p:spPr>
+          <a:xfrm rot="5400000" flipH="1" flipV="1">
+            <a:off x="5038614" y="2101970"/>
+            <a:ext cx="1305492" cy="2391064"/>
+          </a:xfrm>
+          <a:prstGeom prst="curvedConnector5">
+            <a:avLst>
+              <a:gd name="adj1" fmla="val -17511"/>
+              <a:gd name="adj2" fmla="val 50951"/>
+              <a:gd name="adj3" fmla="val 117511"/>
+            </a:avLst>
+          </a:prstGeom>
+          <a:ln w="25400">
+            <a:solidFill>
+              <a:schemeClr val="tx1"/>
+            </a:solidFill>
+            <a:tailEnd type="triangle"/>
+          </a:ln>
+        </p:spPr>
+        <p:style>
+          <a:lnRef idx="1">
+            <a:schemeClr val="accent1"/>
+          </a:lnRef>
+          <a:fillRef idx="0">
+            <a:schemeClr val="accent1"/>
+          </a:fillRef>
+          <a:effectRef idx="0">
+            <a:schemeClr val="accent1"/>
+          </a:effectRef>
+          <a:fontRef idx="minor">
+            <a:schemeClr val="tx1"/>
+          </a:fontRef>
+        </p:style>
+      </p:cxnSp>
       <p:sp>
         <p:nvSpPr>
           <p:cNvPr id="123" name="Rectangle: Rounded Corners 122">
@@ -16540,21 +16688,18 @@
           </p:cNvPr>
           <p:cNvCxnSpPr>
             <a:cxnSpLocks/>
-            <a:stCxn id="41" idx="3"/>
-            <a:endCxn id="126" idx="0"/>
+            <a:stCxn id="24" idx="3"/>
+            <a:endCxn id="126" idx="1"/>
           </p:cNvCxnSpPr>
           <p:nvPr/>
         </p:nvCxnSpPr>
         <p:spPr>
           <a:xfrm flipV="1">
-            <a:off x="5332178" y="3023661"/>
-            <a:ext cx="3659751" cy="340800"/>
-          </a:xfrm>
-          <a:prstGeom prst="curvedConnector4">
-            <a:avLst>
-              <a:gd name="adj1" fmla="val 68798"/>
-              <a:gd name="adj2" fmla="val 238964"/>
-            </a:avLst>
+            <a:off x="7677784" y="3149638"/>
+            <a:ext cx="1092050" cy="180232"/>
+          </a:xfrm>
+          <a:prstGeom prst="curvedConnector3">
+            <a:avLst/>
           </a:prstGeom>
           <a:ln w="25400">
             <a:solidFill>
@@ -16588,21 +16733,19 @@
             </a:extLst>
           </p:cNvPr>
           <p:cNvCxnSpPr>
-            <a:cxnSpLocks/>
-            <a:stCxn id="41" idx="3"/>
             <a:endCxn id="126" idx="0"/>
           </p:cNvCxnSpPr>
           <p:nvPr/>
         </p:nvCxnSpPr>
         <p:spPr>
           <a:xfrm flipV="1">
-            <a:off x="5332178" y="3023661"/>
-            <a:ext cx="3659751" cy="340800"/>
+            <a:off x="7700513" y="3023661"/>
+            <a:ext cx="1291416" cy="314500"/>
           </a:xfrm>
           <a:prstGeom prst="curvedConnector4">
             <a:avLst>
-              <a:gd name="adj1" fmla="val 70496"/>
-              <a:gd name="adj2" fmla="val 238964"/>
+              <a:gd name="adj1" fmla="val 41401"/>
+              <a:gd name="adj2" fmla="val 98136"/>
             </a:avLst>
           </a:prstGeom>
           <a:ln w="25400">
@@ -16637,21 +16780,19 @@
             </a:extLst>
           </p:cNvPr>
           <p:cNvCxnSpPr>
-            <a:cxnSpLocks/>
-            <a:stCxn id="41" idx="3"/>
             <a:endCxn id="126" idx="0"/>
           </p:cNvCxnSpPr>
           <p:nvPr/>
         </p:nvCxnSpPr>
         <p:spPr>
           <a:xfrm flipV="1">
-            <a:off x="5332178" y="3023661"/>
-            <a:ext cx="3659751" cy="340800"/>
+            <a:off x="7723243" y="3023661"/>
+            <a:ext cx="1268686" cy="298679"/>
           </a:xfrm>
           <a:prstGeom prst="curvedConnector4">
             <a:avLst>
-              <a:gd name="adj1" fmla="val 71951"/>
-              <a:gd name="adj2" fmla="val 238964"/>
+              <a:gd name="adj1" fmla="val 41247"/>
+              <a:gd name="adj2" fmla="val 122961"/>
             </a:avLst>
           </a:prstGeom>
           <a:ln w="25400">
@@ -16687,20 +16828,20 @@
           </p:cNvPr>
           <p:cNvCxnSpPr>
             <a:cxnSpLocks/>
-            <a:stCxn id="41" idx="3"/>
+            <a:stCxn id="24" idx="3"/>
             <a:endCxn id="126" idx="0"/>
           </p:cNvCxnSpPr>
           <p:nvPr/>
         </p:nvCxnSpPr>
         <p:spPr>
           <a:xfrm flipV="1">
-            <a:off x="5332178" y="3023661"/>
-            <a:ext cx="3659751" cy="340800"/>
+            <a:off x="7677784" y="3023661"/>
+            <a:ext cx="1314145" cy="306209"/>
           </a:xfrm>
           <a:prstGeom prst="curvedConnector4">
             <a:avLst>
-              <a:gd name="adj1" fmla="val 73164"/>
-              <a:gd name="adj2" fmla="val 238964"/>
+              <a:gd name="adj1" fmla="val 41550"/>
+              <a:gd name="adj2" fmla="val 180656"/>
             </a:avLst>
           </a:prstGeom>
           <a:ln w="25400">
@@ -16735,21 +16876,20 @@
             </a:extLst>
           </p:cNvPr>
           <p:cNvCxnSpPr>
-            <a:cxnSpLocks/>
-            <a:stCxn id="41" idx="3"/>
+            <a:stCxn id="24" idx="3"/>
             <a:endCxn id="126" idx="0"/>
           </p:cNvCxnSpPr>
           <p:nvPr/>
         </p:nvCxnSpPr>
         <p:spPr>
           <a:xfrm flipV="1">
-            <a:off x="5332178" y="3023661"/>
-            <a:ext cx="3659751" cy="340800"/>
+            <a:off x="7677784" y="3023661"/>
+            <a:ext cx="1314145" cy="306209"/>
           </a:xfrm>
           <a:prstGeom prst="curvedConnector4">
             <a:avLst>
-              <a:gd name="adj1" fmla="val 74620"/>
-              <a:gd name="adj2" fmla="val 238964"/>
+              <a:gd name="adj1" fmla="val 41550"/>
+              <a:gd name="adj2" fmla="val 137854"/>
             </a:avLst>
           </a:prstGeom>
           <a:ln w="25400">
@@ -16784,21 +16924,20 @@
             </a:extLst>
           </p:cNvPr>
           <p:cNvCxnSpPr>
-            <a:cxnSpLocks/>
-            <a:stCxn id="41" idx="3"/>
+            <a:stCxn id="24" idx="3"/>
             <a:endCxn id="126" idx="0"/>
           </p:cNvCxnSpPr>
           <p:nvPr/>
         </p:nvCxnSpPr>
         <p:spPr>
           <a:xfrm flipV="1">
-            <a:off x="5332178" y="3023661"/>
-            <a:ext cx="3659751" cy="340800"/>
+            <a:off x="7677784" y="3023661"/>
+            <a:ext cx="1314145" cy="306209"/>
           </a:xfrm>
           <a:prstGeom prst="curvedConnector4">
             <a:avLst>
-              <a:gd name="adj1" fmla="val 77288"/>
-              <a:gd name="adj2" fmla="val 238964"/>
+              <a:gd name="adj1" fmla="val 41550"/>
+              <a:gd name="adj2" fmla="val 153448"/>
             </a:avLst>
           </a:prstGeom>
           <a:ln w="25400">

</xml_diff>